<commit_message>
Modified sequence diagrams and use cases
</commit_message>
<xml_diff>
--- a/Documents/Our Docs/Slides/Sprint2Presentation.pptx
+++ b/Documents/Our Docs/Slides/Sprint2Presentation.pptx
@@ -5,18 +5,19 @@
     <p:sldMasterId id="2147483711" r:id="rId1"/>
   </p:sldMasterIdLst>
   <p:notesMasterIdLst>
-    <p:notesMasterId r:id="rId11"/>
+    <p:notesMasterId r:id="rId12"/>
   </p:notesMasterIdLst>
   <p:sldIdLst>
     <p:sldId id="256" r:id="rId2"/>
-    <p:sldId id="263" r:id="rId3"/>
-    <p:sldId id="257" r:id="rId4"/>
+    <p:sldId id="265" r:id="rId3"/>
+    <p:sldId id="266" r:id="rId4"/>
     <p:sldId id="262" r:id="rId5"/>
-    <p:sldId id="264" r:id="rId6"/>
-    <p:sldId id="261" r:id="rId7"/>
-    <p:sldId id="258" r:id="rId8"/>
-    <p:sldId id="259" r:id="rId9"/>
-    <p:sldId id="260" r:id="rId10"/>
+    <p:sldId id="267" r:id="rId6"/>
+    <p:sldId id="268" r:id="rId7"/>
+    <p:sldId id="269" r:id="rId8"/>
+    <p:sldId id="270" r:id="rId9"/>
+    <p:sldId id="264" r:id="rId10"/>
+    <p:sldId id="260" r:id="rId11"/>
   </p:sldIdLst>
   <p:sldSz cx="12192000" cy="6858000"/>
   <p:notesSz cx="6858000" cy="9144000"/>
@@ -115,6 +116,11 @@
       </a:defRPr>
     </a:lvl9pPr>
   </p:defaultTextStyle>
+  <p:extLst>
+    <p:ext uri="{EFAFB233-063F-42B5-8137-9DF3F51BA10A}">
+      <p15:sldGuideLst xmlns:p15="http://schemas.microsoft.com/office/powerpoint/2012/main"/>
+    </p:ext>
+  </p:extLst>
 </p:presentation>
 </file>
 
@@ -200,7 +206,7 @@
           <a:p>
             <a:fld id="{87857EF3-CB16-4D9F-BA52-FAE19D95CBEC}" type="datetimeFigureOut">
               <a:rPr lang="en-US" smtClean="0"/>
-              <a:t>2/26/2015</a:t>
+              <a:t>2/27/2015</a:t>
             </a:fld>
             <a:endParaRPr lang="en-US"/>
           </a:p>
@@ -683,7 +689,7 @@
           <a:p>
             <a:fld id="{EF7662E3-674D-464C-A6F0-577B5998971D}" type="datetimeFigureOut">
               <a:rPr lang="en-US" smtClean="0"/>
-              <a:t>2/26/2015</a:t>
+              <a:t>2/27/2015</a:t>
             </a:fld>
             <a:endParaRPr lang="en-US"/>
           </a:p>
@@ -853,7 +859,7 @@
           <a:p>
             <a:fld id="{EF7662E3-674D-464C-A6F0-577B5998971D}" type="datetimeFigureOut">
               <a:rPr lang="en-US" smtClean="0"/>
-              <a:t>2/26/2015</a:t>
+              <a:t>2/27/2015</a:t>
             </a:fld>
             <a:endParaRPr lang="en-US"/>
           </a:p>
@@ -1033,7 +1039,7 @@
           <a:p>
             <a:fld id="{EF7662E3-674D-464C-A6F0-577B5998971D}" type="datetimeFigureOut">
               <a:rPr lang="en-US" smtClean="0"/>
-              <a:t>2/26/2015</a:t>
+              <a:t>2/27/2015</a:t>
             </a:fld>
             <a:endParaRPr lang="en-US"/>
           </a:p>
@@ -1203,7 +1209,7 @@
           <a:p>
             <a:fld id="{EF7662E3-674D-464C-A6F0-577B5998971D}" type="datetimeFigureOut">
               <a:rPr lang="en-US" smtClean="0"/>
-              <a:t>2/26/2015</a:t>
+              <a:t>2/27/2015</a:t>
             </a:fld>
             <a:endParaRPr lang="en-US"/>
           </a:p>
@@ -1449,7 +1455,7 @@
           <a:p>
             <a:fld id="{EF7662E3-674D-464C-A6F0-577B5998971D}" type="datetimeFigureOut">
               <a:rPr lang="en-US" smtClean="0"/>
-              <a:t>2/26/2015</a:t>
+              <a:t>2/27/2015</a:t>
             </a:fld>
             <a:endParaRPr lang="en-US"/>
           </a:p>
@@ -1681,7 +1687,7 @@
           <a:p>
             <a:fld id="{EF7662E3-674D-464C-A6F0-577B5998971D}" type="datetimeFigureOut">
               <a:rPr lang="en-US" smtClean="0"/>
-              <a:t>2/26/2015</a:t>
+              <a:t>2/27/2015</a:t>
             </a:fld>
             <a:endParaRPr lang="en-US"/>
           </a:p>
@@ -2048,7 +2054,7 @@
           <a:p>
             <a:fld id="{EF7662E3-674D-464C-A6F0-577B5998971D}" type="datetimeFigureOut">
               <a:rPr lang="en-US" smtClean="0"/>
-              <a:t>2/26/2015</a:t>
+              <a:t>2/27/2015</a:t>
             </a:fld>
             <a:endParaRPr lang="en-US"/>
           </a:p>
@@ -2166,7 +2172,7 @@
           <a:p>
             <a:fld id="{EF7662E3-674D-464C-A6F0-577B5998971D}" type="datetimeFigureOut">
               <a:rPr lang="en-US" smtClean="0"/>
-              <a:t>2/26/2015</a:t>
+              <a:t>2/27/2015</a:t>
             </a:fld>
             <a:endParaRPr lang="en-US"/>
           </a:p>
@@ -2261,7 +2267,7 @@
           <a:p>
             <a:fld id="{EF7662E3-674D-464C-A6F0-577B5998971D}" type="datetimeFigureOut">
               <a:rPr lang="en-US" smtClean="0"/>
-              <a:t>2/26/2015</a:t>
+              <a:t>2/27/2015</a:t>
             </a:fld>
             <a:endParaRPr lang="en-US"/>
           </a:p>
@@ -2538,7 +2544,7 @@
           <a:p>
             <a:fld id="{EF7662E3-674D-464C-A6F0-577B5998971D}" type="datetimeFigureOut">
               <a:rPr lang="en-US" smtClean="0"/>
-              <a:t>2/26/2015</a:t>
+              <a:t>2/27/2015</a:t>
             </a:fld>
             <a:endParaRPr lang="en-US"/>
           </a:p>
@@ -2791,7 +2797,7 @@
           <a:p>
             <a:fld id="{EF7662E3-674D-464C-A6F0-577B5998971D}" type="datetimeFigureOut">
               <a:rPr lang="en-US" smtClean="0"/>
-              <a:t>2/26/2015</a:t>
+              <a:t>2/27/2015</a:t>
             </a:fld>
             <a:endParaRPr lang="en-US"/>
           </a:p>
@@ -3004,7 +3010,7 @@
           <a:p>
             <a:fld id="{EF7662E3-674D-464C-A6F0-577B5998971D}" type="datetimeFigureOut">
               <a:rPr lang="en-US" smtClean="0"/>
-              <a:t>2/26/2015</a:t>
+              <a:t>2/27/2015</a:t>
             </a:fld>
             <a:endParaRPr lang="en-US"/>
           </a:p>
@@ -3431,6 +3437,7 @@
           </a:bodyPr>
           <a:lstStyle/>
           <a:p>
+            <a:pPr algn="ctr"/>
             <a:r>
               <a:rPr lang="en-US" sz="5400" b="1" dirty="0" smtClean="0"/>
               <a:t>Collaborative Platform Version 5.0</a:t>
@@ -3611,7 +3618,7 @@
 </p:sld>
 </file>
 
-<file path=ppt/slides/slide2.xml><?xml version="1.0" encoding="utf-8"?>
+<file path=ppt/slides/slide10.xml><?xml version="1.0" encoding="utf-8"?>
 <p:sld xmlns:a="http://schemas.openxmlformats.org/drawingml/2006/main" xmlns:r="http://schemas.openxmlformats.org/officeDocument/2006/relationships" xmlns:p="http://schemas.openxmlformats.org/presentationml/2006/main">
   <p:cSld>
     <p:spTree>
@@ -3631,7 +3638,205 @@
     </p:spTree>
     <p:extLst>
       <p:ext uri="{BB962C8B-B14F-4D97-AF65-F5344CB8AC3E}">
-        <p14:creationId xmlns:p14="http://schemas.microsoft.com/office/powerpoint/2010/main" val="3088193580"/>
+        <p14:creationId xmlns:p14="http://schemas.microsoft.com/office/powerpoint/2010/main" val="3955818978"/>
+      </p:ext>
+    </p:extLst>
+  </p:cSld>
+  <p:clrMapOvr>
+    <a:masterClrMapping/>
+  </p:clrMapOvr>
+</p:sld>
+</file>
+
+<file path=ppt/slides/slide2.xml><?xml version="1.0" encoding="utf-8"?>
+<p:sld xmlns:a="http://schemas.openxmlformats.org/drawingml/2006/main" xmlns:r="http://schemas.openxmlformats.org/officeDocument/2006/relationships" xmlns:p="http://schemas.openxmlformats.org/presentationml/2006/main">
+  <p:cSld>
+    <p:spTree>
+      <p:nvGrpSpPr>
+        <p:cNvPr id="1" name=""/>
+        <p:cNvGrpSpPr/>
+        <p:nvPr/>
+      </p:nvGrpSpPr>
+      <p:grpSpPr>
+        <a:xfrm>
+          <a:off x="0" y="0"/>
+          <a:ext cx="0" cy="0"/>
+          <a:chOff x="0" y="0"/>
+          <a:chExt cx="0" cy="0"/>
+        </a:xfrm>
+      </p:grpSpPr>
+      <p:sp>
+        <p:nvSpPr>
+          <p:cNvPr id="3" name="TextBox 2"/>
+          <p:cNvSpPr txBox="1"/>
+          <p:nvPr/>
+        </p:nvSpPr>
+        <p:spPr>
+          <a:xfrm>
+            <a:off x="377232" y="35353"/>
+            <a:ext cx="4544514" cy="923330"/>
+          </a:xfrm>
+          <a:prstGeom prst="rect">
+            <a:avLst/>
+          </a:prstGeom>
+          <a:noFill/>
+        </p:spPr>
+        <p:txBody>
+          <a:bodyPr wrap="none" rtlCol="0">
+            <a:spAutoFit/>
+          </a:bodyPr>
+          <a:lstStyle/>
+          <a:p>
+            <a:r>
+              <a:rPr lang="en-US" sz="5400" b="1" dirty="0" smtClean="0"/>
+              <a:t>Sprint 2 Stories</a:t>
+            </a:r>
+            <a:endParaRPr lang="en-US" sz="5400" b="1" dirty="0"/>
+          </a:p>
+        </p:txBody>
+      </p:sp>
+      <p:pic>
+        <p:nvPicPr>
+          <p:cNvPr id="4" name="Picture 3"/>
+          <p:cNvPicPr>
+            <a:picLocks noChangeAspect="1"/>
+          </p:cNvPicPr>
+          <p:nvPr/>
+        </p:nvPicPr>
+        <p:blipFill>
+          <a:blip r:embed="rId2"/>
+          <a:stretch>
+            <a:fillRect/>
+          </a:stretch>
+        </p:blipFill>
+        <p:spPr>
+          <a:xfrm>
+            <a:off x="377232" y="958683"/>
+            <a:ext cx="3949108" cy="5059980"/>
+          </a:xfrm>
+          <a:prstGeom prst="rect">
+            <a:avLst/>
+          </a:prstGeom>
+        </p:spPr>
+      </p:pic>
+      <p:sp>
+        <p:nvSpPr>
+          <p:cNvPr id="5" name="TextBox 4"/>
+          <p:cNvSpPr txBox="1"/>
+          <p:nvPr/>
+        </p:nvSpPr>
+        <p:spPr>
+          <a:xfrm>
+            <a:off x="5947847" y="35353"/>
+            <a:ext cx="5636158" cy="923330"/>
+          </a:xfrm>
+          <a:prstGeom prst="rect">
+            <a:avLst/>
+          </a:prstGeom>
+          <a:noFill/>
+        </p:spPr>
+        <p:txBody>
+          <a:bodyPr wrap="none" rtlCol="0">
+            <a:spAutoFit/>
+          </a:bodyPr>
+          <a:lstStyle/>
+          <a:p>
+            <a:r>
+              <a:rPr lang="en-US" sz="5400" b="1" dirty="0" smtClean="0"/>
+              <a:t>My Sprint 2 Stories</a:t>
+            </a:r>
+            <a:endParaRPr lang="en-US" sz="5400" b="1" dirty="0"/>
+          </a:p>
+        </p:txBody>
+      </p:sp>
+      <p:sp>
+        <p:nvSpPr>
+          <p:cNvPr id="6" name="TextBox 5"/>
+          <p:cNvSpPr txBox="1"/>
+          <p:nvPr/>
+        </p:nvSpPr>
+        <p:spPr>
+          <a:xfrm>
+            <a:off x="2281474" y="4435958"/>
+            <a:ext cx="1896631" cy="1569660"/>
+          </a:xfrm>
+          <a:prstGeom prst="rect">
+            <a:avLst/>
+          </a:prstGeom>
+          <a:noFill/>
+        </p:spPr>
+        <p:txBody>
+          <a:bodyPr wrap="square" rtlCol="0">
+            <a:spAutoFit/>
+          </a:bodyPr>
+          <a:lstStyle/>
+          <a:p>
+            <a:r>
+              <a:rPr lang="en-US" sz="4800" b="1" dirty="0" smtClean="0"/>
+              <a:t>Total 66 pts</a:t>
+            </a:r>
+            <a:endParaRPr lang="en-US" sz="4800" b="1" dirty="0"/>
+          </a:p>
+        </p:txBody>
+      </p:sp>
+      <p:pic>
+        <p:nvPicPr>
+          <p:cNvPr id="7" name="Picture 6"/>
+          <p:cNvPicPr>
+            <a:picLocks noChangeAspect="1"/>
+          </p:cNvPicPr>
+          <p:nvPr/>
+        </p:nvPicPr>
+        <p:blipFill>
+          <a:blip r:embed="rId3"/>
+          <a:stretch>
+            <a:fillRect/>
+          </a:stretch>
+        </p:blipFill>
+        <p:spPr>
+          <a:xfrm>
+            <a:off x="6037331" y="958683"/>
+            <a:ext cx="1790817" cy="5059980"/>
+          </a:xfrm>
+          <a:prstGeom prst="rect">
+            <a:avLst/>
+          </a:prstGeom>
+        </p:spPr>
+      </p:pic>
+      <p:sp>
+        <p:nvSpPr>
+          <p:cNvPr id="8" name="TextBox 7"/>
+          <p:cNvSpPr txBox="1"/>
+          <p:nvPr/>
+        </p:nvSpPr>
+        <p:spPr>
+          <a:xfrm>
+            <a:off x="7828148" y="4449003"/>
+            <a:ext cx="1777079" cy="1569660"/>
+          </a:xfrm>
+          <a:prstGeom prst="rect">
+            <a:avLst/>
+          </a:prstGeom>
+          <a:noFill/>
+        </p:spPr>
+        <p:txBody>
+          <a:bodyPr wrap="square" rtlCol="0">
+            <a:spAutoFit/>
+          </a:bodyPr>
+          <a:lstStyle/>
+          <a:p>
+            <a:r>
+              <a:rPr lang="en-US" sz="4800" b="1" dirty="0" smtClean="0"/>
+              <a:t>Total 30 pts</a:t>
+            </a:r>
+            <a:endParaRPr lang="en-US" sz="4800" b="1" dirty="0"/>
+          </a:p>
+        </p:txBody>
+      </p:sp>
+    </p:spTree>
+    <p:extLst>
+      <p:ext uri="{BB962C8B-B14F-4D97-AF65-F5344CB8AC3E}">
+        <p14:creationId xmlns:p14="http://schemas.microsoft.com/office/powerpoint/2010/main" val="2737986624"/>
       </p:ext>
     </p:extLst>
   </p:cSld>
@@ -3665,16 +3870,126 @@
           <a:chExt cx="0" cy="0"/>
         </a:xfrm>
       </p:grpSpPr>
+      <p:sp>
+        <p:nvSpPr>
+          <p:cNvPr id="3" name="TextBox 2"/>
+          <p:cNvSpPr txBox="1"/>
+          <p:nvPr/>
+        </p:nvSpPr>
+        <p:spPr>
+          <a:xfrm>
+            <a:off x="3289240" y="35353"/>
+            <a:ext cx="4019049" cy="923330"/>
+          </a:xfrm>
+          <a:prstGeom prst="rect">
+            <a:avLst/>
+          </a:prstGeom>
+          <a:noFill/>
+        </p:spPr>
+        <p:txBody>
+          <a:bodyPr wrap="none" rtlCol="0">
+            <a:spAutoFit/>
+          </a:bodyPr>
+          <a:lstStyle/>
+          <a:p>
+            <a:pPr algn="ctr"/>
+            <a:r>
+              <a:rPr lang="en-US" sz="5400" b="1" dirty="0" smtClean="0"/>
+              <a:t>Daily Scrums </a:t>
+            </a:r>
+            <a:endParaRPr lang="en-US" sz="5400" b="1" dirty="0"/>
+          </a:p>
+        </p:txBody>
+      </p:sp>
+      <p:pic>
+        <p:nvPicPr>
+          <p:cNvPr id="2" name="Picture 1"/>
+          <p:cNvPicPr>
+            <a:picLocks noChangeAspect="1"/>
+          </p:cNvPicPr>
+          <p:nvPr/>
+        </p:nvPicPr>
+        <p:blipFill>
+          <a:blip r:embed="rId2"/>
+          <a:stretch>
+            <a:fillRect/>
+          </a:stretch>
+        </p:blipFill>
+        <p:spPr>
+          <a:xfrm>
+            <a:off x="616387" y="1105266"/>
+            <a:ext cx="3435113" cy="5210175"/>
+          </a:xfrm>
+          <a:prstGeom prst="rect">
+            <a:avLst/>
+          </a:prstGeom>
+        </p:spPr>
+      </p:pic>
+      <p:pic>
+        <p:nvPicPr>
+          <p:cNvPr id="9" name="Picture 8"/>
+          <p:cNvPicPr>
+            <a:picLocks noChangeAspect="1"/>
+          </p:cNvPicPr>
+          <p:nvPr/>
+        </p:nvPicPr>
+        <p:blipFill>
+          <a:blip r:embed="rId3"/>
+          <a:stretch>
+            <a:fillRect/>
+          </a:stretch>
+        </p:blipFill>
+        <p:spPr>
+          <a:xfrm>
+            <a:off x="5106578" y="1105265"/>
+            <a:ext cx="2855741" cy="5210175"/>
+          </a:xfrm>
+          <a:prstGeom prst="rect">
+            <a:avLst/>
+          </a:prstGeom>
+        </p:spPr>
+      </p:pic>
+      <p:pic>
+        <p:nvPicPr>
+          <p:cNvPr id="10" name="Picture 9"/>
+          <p:cNvPicPr>
+            <a:picLocks noChangeAspect="1"/>
+          </p:cNvPicPr>
+          <p:nvPr/>
+        </p:nvPicPr>
+        <p:blipFill>
+          <a:blip r:embed="rId4"/>
+          <a:stretch>
+            <a:fillRect/>
+          </a:stretch>
+        </p:blipFill>
+        <p:spPr>
+          <a:xfrm>
+            <a:off x="8840231" y="1105265"/>
+            <a:ext cx="2305050" cy="2305050"/>
+          </a:xfrm>
+          <a:prstGeom prst="rect">
+            <a:avLst/>
+          </a:prstGeom>
+        </p:spPr>
+      </p:pic>
     </p:spTree>
     <p:extLst>
       <p:ext uri="{BB962C8B-B14F-4D97-AF65-F5344CB8AC3E}">
-        <p14:creationId xmlns:p14="http://schemas.microsoft.com/office/powerpoint/2010/main" val="16256989"/>
+        <p14:creationId xmlns:p14="http://schemas.microsoft.com/office/powerpoint/2010/main" val="4176931201"/>
       </p:ext>
     </p:extLst>
   </p:cSld>
   <p:clrMapOvr>
     <a:masterClrMapping/>
   </p:clrMapOvr>
+  <p:timing>
+    <p:tnLst>
+      <p:par>
+        <p:cTn id="1" dur="indefinite" restart="never" nodeType="tmRoot"/>
+      </p:par>
+    </p:tnLst>
+  </p:timing>
 </p:sld>
 </file>
 
@@ -3733,7 +4048,7 @@
         </p:nvSpPr>
         <p:spPr>
           <a:xfrm>
-            <a:off x="4285212" y="0"/>
+            <a:off x="3903068" y="0"/>
             <a:ext cx="3630674" cy="923330"/>
           </a:xfrm>
           <a:prstGeom prst="rect">
@@ -3747,6 +4062,7 @@
           </a:bodyPr>
           <a:lstStyle/>
           <a:p>
+            <a:pPr algn="ctr"/>
             <a:r>
               <a:rPr lang="en-US" sz="5400" b="1" dirty="0" smtClean="0"/>
               <a:t>Project plan</a:t>
@@ -3793,8 +4109,8 @@
         </p:nvSpPr>
         <p:spPr>
           <a:xfrm>
-            <a:off x="4285212" y="0"/>
-            <a:ext cx="3481274" cy="923330"/>
+            <a:off x="3166705" y="0"/>
+            <a:ext cx="5811207" cy="923330"/>
           </a:xfrm>
           <a:prstGeom prst="rect">
             <a:avLst/>
@@ -3807,9 +4123,108 @@
           </a:bodyPr>
           <a:lstStyle/>
           <a:p>
+            <a:pPr algn="ctr"/>
             <a:r>
               <a:rPr lang="en-US" sz="5400" b="1" dirty="0" smtClean="0"/>
-              <a:t>ER Diagram</a:t>
+              <a:t>Use Cases Modified</a:t>
+            </a:r>
+            <a:endParaRPr lang="en-US" sz="5400" b="1" dirty="0"/>
+          </a:p>
+        </p:txBody>
+      </p:sp>
+      <p:pic>
+        <p:nvPicPr>
+          <p:cNvPr id="7" name="Picture 6"/>
+          <p:cNvPicPr>
+            <a:picLocks noChangeAspect="1"/>
+          </p:cNvPicPr>
+          <p:nvPr/>
+        </p:nvPicPr>
+        <p:blipFill>
+          <a:blip r:embed="rId2">
+            <a:extLst>
+              <a:ext uri="{28A0092B-C50C-407E-A947-70E740481C1C}">
+                <a14:useLocalDpi xmlns:a14="http://schemas.microsoft.com/office/drawing/2010/main" val="0"/>
+              </a:ext>
+            </a:extLst>
+          </a:blip>
+          <a:stretch>
+            <a:fillRect/>
+          </a:stretch>
+        </p:blipFill>
+        <p:spPr>
+          <a:xfrm>
+            <a:off x="2388359" y="923330"/>
+            <a:ext cx="7574508" cy="5354640"/>
+          </a:xfrm>
+          <a:prstGeom prst="rect">
+            <a:avLst/>
+          </a:prstGeom>
+        </p:spPr>
+      </p:pic>
+    </p:spTree>
+    <p:extLst>
+      <p:ext uri="{BB962C8B-B14F-4D97-AF65-F5344CB8AC3E}">
+        <p14:creationId xmlns:p14="http://schemas.microsoft.com/office/powerpoint/2010/main" val="3339906219"/>
+      </p:ext>
+    </p:extLst>
+  </p:cSld>
+  <p:clrMapOvr>
+    <a:masterClrMapping/>
+  </p:clrMapOvr>
+  <p:timing>
+    <p:tnLst>
+      <p:par>
+        <p:cTn id="1" dur="indefinite" restart="never" nodeType="tmRoot"/>
+      </p:par>
+    </p:tnLst>
+  </p:timing>
+</p:sld>
+</file>
+
+<file path=ppt/slides/slide6.xml><?xml version="1.0" encoding="utf-8"?>
+<p:sld xmlns:a="http://schemas.openxmlformats.org/drawingml/2006/main" xmlns:r="http://schemas.openxmlformats.org/officeDocument/2006/relationships" xmlns:p="http://schemas.openxmlformats.org/presentationml/2006/main">
+  <p:cSld>
+    <p:spTree>
+      <p:nvGrpSpPr>
+        <p:cNvPr id="1" name=""/>
+        <p:cNvGrpSpPr/>
+        <p:nvPr/>
+      </p:nvGrpSpPr>
+      <p:grpSpPr>
+        <a:xfrm>
+          <a:off x="0" y="0"/>
+          <a:ext cx="0" cy="0"/>
+          <a:chOff x="0" y="0"/>
+          <a:chExt cx="0" cy="0"/>
+        </a:xfrm>
+      </p:grpSpPr>
+      <p:sp>
+        <p:nvSpPr>
+          <p:cNvPr id="3" name="TextBox 2"/>
+          <p:cNvSpPr txBox="1"/>
+          <p:nvPr/>
+        </p:nvSpPr>
+        <p:spPr>
+          <a:xfrm>
+            <a:off x="1149622" y="0"/>
+            <a:ext cx="9845388" cy="923330"/>
+          </a:xfrm>
+          <a:prstGeom prst="rect">
+            <a:avLst/>
+          </a:prstGeom>
+          <a:noFill/>
+        </p:spPr>
+        <p:txBody>
+          <a:bodyPr wrap="none" rtlCol="0">
+            <a:spAutoFit/>
+          </a:bodyPr>
+          <a:lstStyle/>
+          <a:p>
+            <a:pPr algn="ctr"/>
+            <a:r>
+              <a:rPr lang="en-US" sz="5400" b="1" dirty="0" smtClean="0"/>
+              <a:t>Sequence Diagram (Create Ticket)</a:t>
             </a:r>
             <a:endParaRPr lang="en-US" sz="5400" b="1" dirty="0"/>
           </a:p>
@@ -3837,8 +4252,8 @@
         </p:blipFill>
         <p:spPr>
           <a:xfrm>
-            <a:off x="327546" y="923330"/>
-            <a:ext cx="11682484" cy="5520332"/>
+            <a:off x="177421" y="952500"/>
+            <a:ext cx="11696131" cy="5680312"/>
           </a:xfrm>
           <a:prstGeom prst="rect">
             <a:avLst/>
@@ -3848,43 +4263,20 @@
     </p:spTree>
     <p:extLst>
       <p:ext uri="{BB962C8B-B14F-4D97-AF65-F5344CB8AC3E}">
-        <p14:creationId xmlns:p14="http://schemas.microsoft.com/office/powerpoint/2010/main" val="3687344030"/>
+        <p14:creationId xmlns:p14="http://schemas.microsoft.com/office/powerpoint/2010/main" val="2855734241"/>
       </p:ext>
     </p:extLst>
   </p:cSld>
   <p:clrMapOvr>
     <a:masterClrMapping/>
   </p:clrMapOvr>
-</p:sld>
-</file>
-
-<file path=ppt/slides/slide6.xml><?xml version="1.0" encoding="utf-8"?>
-<p:sld xmlns:a="http://schemas.openxmlformats.org/drawingml/2006/main" xmlns:r="http://schemas.openxmlformats.org/officeDocument/2006/relationships" xmlns:p="http://schemas.openxmlformats.org/presentationml/2006/main">
-  <p:cSld>
-    <p:spTree>
-      <p:nvGrpSpPr>
-        <p:cNvPr id="1" name=""/>
-        <p:cNvGrpSpPr/>
-        <p:nvPr/>
-      </p:nvGrpSpPr>
-      <p:grpSpPr>
-        <a:xfrm>
-          <a:off x="0" y="0"/>
-          <a:ext cx="0" cy="0"/>
-          <a:chOff x="0" y="0"/>
-          <a:chExt cx="0" cy="0"/>
-        </a:xfrm>
-      </p:grpSpPr>
-    </p:spTree>
-    <p:extLst>
-      <p:ext uri="{BB962C8B-B14F-4D97-AF65-F5344CB8AC3E}">
-        <p14:creationId xmlns:p14="http://schemas.microsoft.com/office/powerpoint/2010/main" val="3991501594"/>
-      </p:ext>
-    </p:extLst>
-  </p:cSld>
-  <p:clrMapOvr>
-    <a:masterClrMapping/>
-  </p:clrMapOvr>
+  <p:timing>
+    <p:tnLst>
+      <p:par>
+        <p:cTn id="1" dur="indefinite" restart="never" nodeType="tmRoot"/>
+      </p:par>
+    </p:tnLst>
+  </p:timing>
 </p:sld>
 </file>
 
@@ -3905,16 +4297,84 @@
           <a:chExt cx="0" cy="0"/>
         </a:xfrm>
       </p:grpSpPr>
+      <p:sp>
+        <p:nvSpPr>
+          <p:cNvPr id="3" name="TextBox 2"/>
+          <p:cNvSpPr txBox="1"/>
+          <p:nvPr/>
+        </p:nvSpPr>
+        <p:spPr>
+          <a:xfrm>
+            <a:off x="1358848" y="0"/>
+            <a:ext cx="9426940" cy="923330"/>
+          </a:xfrm>
+          <a:prstGeom prst="rect">
+            <a:avLst/>
+          </a:prstGeom>
+          <a:noFill/>
+        </p:spPr>
+        <p:txBody>
+          <a:bodyPr wrap="none" rtlCol="0">
+            <a:spAutoFit/>
+          </a:bodyPr>
+          <a:lstStyle/>
+          <a:p>
+            <a:pPr algn="ctr"/>
+            <a:r>
+              <a:rPr lang="en-US" sz="5400" b="1" dirty="0" smtClean="0"/>
+              <a:t>Sequence Diagram (View Ticket)</a:t>
+            </a:r>
+            <a:endParaRPr lang="en-US" sz="5400" b="1" dirty="0"/>
+          </a:p>
+        </p:txBody>
+      </p:sp>
+      <p:pic>
+        <p:nvPicPr>
+          <p:cNvPr id="6" name="Picture 5"/>
+          <p:cNvPicPr>
+            <a:picLocks noChangeAspect="1"/>
+          </p:cNvPicPr>
+          <p:nvPr/>
+        </p:nvPicPr>
+        <p:blipFill>
+          <a:blip r:embed="rId2">
+            <a:extLst>
+              <a:ext uri="{28A0092B-C50C-407E-A947-70E740481C1C}">
+                <a14:useLocalDpi xmlns:a14="http://schemas.microsoft.com/office/drawing/2010/main" val="0"/>
+              </a:ext>
+            </a:extLst>
+          </a:blip>
+          <a:stretch>
+            <a:fillRect/>
+          </a:stretch>
+        </p:blipFill>
+        <p:spPr>
+          <a:xfrm>
+            <a:off x="338635" y="923330"/>
+            <a:ext cx="11466678" cy="5723130"/>
+          </a:xfrm>
+          <a:prstGeom prst="rect">
+            <a:avLst/>
+          </a:prstGeom>
+        </p:spPr>
+      </p:pic>
     </p:spTree>
     <p:extLst>
       <p:ext uri="{BB962C8B-B14F-4D97-AF65-F5344CB8AC3E}">
-        <p14:creationId xmlns:p14="http://schemas.microsoft.com/office/powerpoint/2010/main" val="1810163880"/>
+        <p14:creationId xmlns:p14="http://schemas.microsoft.com/office/powerpoint/2010/main" val="2101179196"/>
       </p:ext>
     </p:extLst>
   </p:cSld>
   <p:clrMapOvr>
     <a:masterClrMapping/>
   </p:clrMapOvr>
+  <p:timing>
+    <p:tnLst>
+      <p:par>
+        <p:cTn id="1" dur="indefinite" restart="never" nodeType="tmRoot"/>
+      </p:par>
+    </p:tnLst>
+  </p:timing>
 </p:sld>
 </file>
 
@@ -3935,16 +4395,54 @@
           <a:chExt cx="0" cy="0"/>
         </a:xfrm>
       </p:grpSpPr>
+      <p:sp>
+        <p:nvSpPr>
+          <p:cNvPr id="3" name="TextBox 2"/>
+          <p:cNvSpPr txBox="1"/>
+          <p:nvPr/>
+        </p:nvSpPr>
+        <p:spPr>
+          <a:xfrm>
+            <a:off x="590368" y="0"/>
+            <a:ext cx="10963900" cy="923330"/>
+          </a:xfrm>
+          <a:prstGeom prst="rect">
+            <a:avLst/>
+          </a:prstGeom>
+          <a:noFill/>
+        </p:spPr>
+        <p:txBody>
+          <a:bodyPr wrap="none" rtlCol="0">
+            <a:spAutoFit/>
+          </a:bodyPr>
+          <a:lstStyle/>
+          <a:p>
+            <a:pPr algn="ctr"/>
+            <a:r>
+              <a:rPr lang="en-US" sz="5400" b="1" dirty="0" smtClean="0"/>
+              <a:t>Sequence Diagram (Create Comment)</a:t>
+            </a:r>
+            <a:endParaRPr lang="en-US" sz="5400" b="1" dirty="0"/>
+          </a:p>
+        </p:txBody>
+      </p:sp>
     </p:spTree>
     <p:extLst>
       <p:ext uri="{BB962C8B-B14F-4D97-AF65-F5344CB8AC3E}">
-        <p14:creationId xmlns:p14="http://schemas.microsoft.com/office/powerpoint/2010/main" val="2003642854"/>
+        <p14:creationId xmlns:p14="http://schemas.microsoft.com/office/powerpoint/2010/main" val="1836531638"/>
       </p:ext>
     </p:extLst>
   </p:cSld>
   <p:clrMapOvr>
     <a:masterClrMapping/>
   </p:clrMapOvr>
+  <p:timing>
+    <p:tnLst>
+      <p:par>
+        <p:cTn id="1" dur="indefinite" restart="never" nodeType="tmRoot"/>
+      </p:par>
+    </p:tnLst>
+  </p:timing>
 </p:sld>
 </file>
 
@@ -3965,10 +4463,70 @@
           <a:chExt cx="0" cy="0"/>
         </a:xfrm>
       </p:grpSpPr>
+      <p:sp>
+        <p:nvSpPr>
+          <p:cNvPr id="3" name="TextBox 2"/>
+          <p:cNvSpPr txBox="1"/>
+          <p:nvPr/>
+        </p:nvSpPr>
+        <p:spPr>
+          <a:xfrm>
+            <a:off x="4285212" y="0"/>
+            <a:ext cx="3481274" cy="923330"/>
+          </a:xfrm>
+          <a:prstGeom prst="rect">
+            <a:avLst/>
+          </a:prstGeom>
+          <a:noFill/>
+        </p:spPr>
+        <p:txBody>
+          <a:bodyPr wrap="none" rtlCol="0">
+            <a:spAutoFit/>
+          </a:bodyPr>
+          <a:lstStyle/>
+          <a:p>
+            <a:r>
+              <a:rPr lang="en-US" sz="5400" b="1" dirty="0" smtClean="0"/>
+              <a:t>ER Diagram</a:t>
+            </a:r>
+            <a:endParaRPr lang="en-US" sz="5400" b="1" dirty="0"/>
+          </a:p>
+        </p:txBody>
+      </p:sp>
+      <p:pic>
+        <p:nvPicPr>
+          <p:cNvPr id="4" name="Picture 3"/>
+          <p:cNvPicPr>
+            <a:picLocks noChangeAspect="1"/>
+          </p:cNvPicPr>
+          <p:nvPr/>
+        </p:nvPicPr>
+        <p:blipFill>
+          <a:blip r:embed="rId2">
+            <a:extLst>
+              <a:ext uri="{28A0092B-C50C-407E-A947-70E740481C1C}">
+                <a14:useLocalDpi xmlns:a14="http://schemas.microsoft.com/office/drawing/2010/main" val="0"/>
+              </a:ext>
+            </a:extLst>
+          </a:blip>
+          <a:stretch>
+            <a:fillRect/>
+          </a:stretch>
+        </p:blipFill>
+        <p:spPr>
+          <a:xfrm>
+            <a:off x="327546" y="923330"/>
+            <a:ext cx="11682484" cy="5520332"/>
+          </a:xfrm>
+          <a:prstGeom prst="rect">
+            <a:avLst/>
+          </a:prstGeom>
+        </p:spPr>
+      </p:pic>
     </p:spTree>
     <p:extLst>
       <p:ext uri="{BB962C8B-B14F-4D97-AF65-F5344CB8AC3E}">
-        <p14:creationId xmlns:p14="http://schemas.microsoft.com/office/powerpoint/2010/main" val="3955818978"/>
+        <p14:creationId xmlns:p14="http://schemas.microsoft.com/office/powerpoint/2010/main" val="3687344030"/>
       </p:ext>
     </p:extLst>
   </p:cSld>

</xml_diff>

<commit_message>
Corrected email set up in the installation guide
</commit_message>
<xml_diff>
--- a/Documents/Our Docs/Slides/Sprint2Presentation.pptx
+++ b/Documents/Our Docs/Slides/Sprint2Presentation.pptx
@@ -5,7 +5,7 @@
     <p:sldMasterId id="2147483711" r:id="rId1"/>
   </p:sldMasterIdLst>
   <p:notesMasterIdLst>
-    <p:notesMasterId r:id="rId16"/>
+    <p:notesMasterId r:id="rId18"/>
   </p:notesMasterIdLst>
   <p:sldIdLst>
     <p:sldId id="256" r:id="rId2"/>
@@ -21,7 +21,9 @@
     <p:sldId id="273" r:id="rId12"/>
     <p:sldId id="274" r:id="rId13"/>
     <p:sldId id="264" r:id="rId14"/>
-    <p:sldId id="260" r:id="rId15"/>
+    <p:sldId id="275" r:id="rId15"/>
+    <p:sldId id="276" r:id="rId16"/>
+    <p:sldId id="277" r:id="rId17"/>
   </p:sldIdLst>
   <p:sldSz cx="12192000" cy="6858000"/>
   <p:notesSz cx="6858000" cy="9144000"/>
@@ -3664,11 +3666,7 @@
             <a:pPr algn="ctr"/>
             <a:r>
               <a:rPr lang="en-US" sz="5400" b="1" dirty="0" smtClean="0"/>
-              <a:t>Sequence Diagram </a:t>
-            </a:r>
-            <a:r>
-              <a:rPr lang="en-US" sz="5400" b="1" dirty="0" smtClean="0"/>
-              <a:t>(Re Assign)</a:t>
+              <a:t>Sequence Diagram (Re Assign)</a:t>
             </a:r>
             <a:endParaRPr lang="en-US" sz="5400" b="1" dirty="0"/>
           </a:p>
@@ -3766,15 +3764,7 @@
             <a:pPr algn="ctr"/>
             <a:r>
               <a:rPr lang="en-US" sz="5400" b="1" dirty="0" smtClean="0"/>
-              <a:t>Sequence Diagram </a:t>
-            </a:r>
-            <a:r>
-              <a:rPr lang="en-US" sz="5400" b="1" dirty="0" smtClean="0"/>
-              <a:t>(Escalate</a:t>
-            </a:r>
-            <a:r>
-              <a:rPr lang="en-US" sz="5400" b="1" dirty="0" smtClean="0"/>
-              <a:t>)</a:t>
+              <a:t>Sequence Diagram (Escalate)</a:t>
             </a:r>
             <a:endParaRPr lang="en-US" sz="5400" b="1" dirty="0"/>
           </a:p>
@@ -3872,19 +3862,7 @@
             <a:pPr algn="ctr"/>
             <a:r>
               <a:rPr lang="en-US" sz="5400" b="1" dirty="0" smtClean="0"/>
-              <a:t>Class </a:t>
-            </a:r>
-            <a:r>
-              <a:rPr lang="en-US" sz="5400" b="1" dirty="0" smtClean="0"/>
-              <a:t>Diagram </a:t>
-            </a:r>
-            <a:r>
-              <a:rPr lang="en-US" sz="5400" b="1" dirty="0" smtClean="0"/>
-              <a:t>(Ticket Events</a:t>
-            </a:r>
-            <a:r>
-              <a:rPr lang="en-US" sz="5400" b="1" dirty="0" smtClean="0"/>
-              <a:t>)</a:t>
+              <a:t>Class Diagram (Ticket Events)</a:t>
             </a:r>
             <a:endParaRPr lang="en-US" sz="5400" b="1" dirty="0"/>
           </a:p>
@@ -4047,16 +4025,347 @@
           <a:chExt cx="0" cy="0"/>
         </a:xfrm>
       </p:grpSpPr>
+      <p:sp>
+        <p:nvSpPr>
+          <p:cNvPr id="3" name="TextBox 2"/>
+          <p:cNvSpPr txBox="1"/>
+          <p:nvPr/>
+        </p:nvSpPr>
+        <p:spPr>
+          <a:xfrm>
+            <a:off x="4285212" y="0"/>
+            <a:ext cx="4841646" cy="923330"/>
+          </a:xfrm>
+          <a:prstGeom prst="rect">
+            <a:avLst/>
+          </a:prstGeom>
+          <a:noFill/>
+        </p:spPr>
+        <p:txBody>
+          <a:bodyPr wrap="none" rtlCol="0">
+            <a:spAutoFit/>
+          </a:bodyPr>
+          <a:lstStyle/>
+          <a:p>
+            <a:r>
+              <a:rPr lang="en-US" sz="5400" b="1" dirty="0" err="1"/>
+              <a:t>Burndown</a:t>
+            </a:r>
+            <a:r>
+              <a:rPr lang="en-US" sz="5400" dirty="0"/>
+              <a:t> </a:t>
+            </a:r>
+            <a:r>
+              <a:rPr lang="en-US" sz="5400" b="1" dirty="0" smtClean="0"/>
+              <a:t>chart</a:t>
+            </a:r>
+          </a:p>
+        </p:txBody>
+      </p:sp>
     </p:spTree>
     <p:extLst>
       <p:ext uri="{BB962C8B-B14F-4D97-AF65-F5344CB8AC3E}">
-        <p14:creationId xmlns:p14="http://schemas.microsoft.com/office/powerpoint/2010/main" val="3955818978"/>
+        <p14:creationId xmlns:p14="http://schemas.microsoft.com/office/powerpoint/2010/main" val="2876709658"/>
       </p:ext>
     </p:extLst>
   </p:cSld>
   <p:clrMapOvr>
     <a:masterClrMapping/>
   </p:clrMapOvr>
+</p:sld>
+</file>
+
+<file path=ppt/slides/slide15.xml><?xml version="1.0" encoding="utf-8"?>
+<p:sld xmlns:a="http://schemas.openxmlformats.org/drawingml/2006/main" xmlns:r="http://schemas.openxmlformats.org/officeDocument/2006/relationships" xmlns:p="http://schemas.openxmlformats.org/presentationml/2006/main">
+  <p:cSld>
+    <p:spTree>
+      <p:nvGrpSpPr>
+        <p:cNvPr id="1" name=""/>
+        <p:cNvGrpSpPr/>
+        <p:nvPr/>
+      </p:nvGrpSpPr>
+      <p:grpSpPr>
+        <a:xfrm>
+          <a:off x="0" y="0"/>
+          <a:ext cx="0" cy="0"/>
+          <a:chOff x="0" y="0"/>
+          <a:chExt cx="0" cy="0"/>
+        </a:xfrm>
+      </p:grpSpPr>
+      <p:sp>
+        <p:nvSpPr>
+          <p:cNvPr id="3" name="TextBox 2"/>
+          <p:cNvSpPr txBox="1"/>
+          <p:nvPr/>
+        </p:nvSpPr>
+        <p:spPr>
+          <a:xfrm>
+            <a:off x="4285212" y="0"/>
+            <a:ext cx="4122347" cy="923330"/>
+          </a:xfrm>
+          <a:prstGeom prst="rect">
+            <a:avLst/>
+          </a:prstGeom>
+          <a:noFill/>
+        </p:spPr>
+        <p:txBody>
+          <a:bodyPr wrap="none" rtlCol="0">
+            <a:spAutoFit/>
+          </a:bodyPr>
+          <a:lstStyle/>
+          <a:p>
+            <a:r>
+              <a:rPr lang="en-US" sz="5400" b="1" dirty="0" smtClean="0"/>
+              <a:t>Retrospective</a:t>
+            </a:r>
+          </a:p>
+        </p:txBody>
+      </p:sp>
+      <p:pic>
+        <p:nvPicPr>
+          <p:cNvPr id="2" name="Picture 1"/>
+          <p:cNvPicPr>
+            <a:picLocks noChangeAspect="1"/>
+          </p:cNvPicPr>
+          <p:nvPr/>
+        </p:nvPicPr>
+        <p:blipFill>
+          <a:blip r:embed="rId2"/>
+          <a:stretch>
+            <a:fillRect/>
+          </a:stretch>
+        </p:blipFill>
+        <p:spPr>
+          <a:xfrm>
+            <a:off x="2632119" y="1168376"/>
+            <a:ext cx="7428532" cy="4577332"/>
+          </a:xfrm>
+          <a:prstGeom prst="rect">
+            <a:avLst/>
+          </a:prstGeom>
+        </p:spPr>
+      </p:pic>
+    </p:spTree>
+    <p:extLst>
+      <p:ext uri="{BB962C8B-B14F-4D97-AF65-F5344CB8AC3E}">
+        <p14:creationId xmlns:p14="http://schemas.microsoft.com/office/powerpoint/2010/main" val="1847851469"/>
+      </p:ext>
+    </p:extLst>
+  </p:cSld>
+  <p:clrMapOvr>
+    <a:masterClrMapping/>
+  </p:clrMapOvr>
+</p:sld>
+</file>
+
+<file path=ppt/slides/slide16.xml><?xml version="1.0" encoding="utf-8"?>
+<p:sld xmlns:a="http://schemas.openxmlformats.org/drawingml/2006/main" xmlns:r="http://schemas.openxmlformats.org/officeDocument/2006/relationships" xmlns:p="http://schemas.openxmlformats.org/presentationml/2006/main">
+  <p:cSld>
+    <p:spTree>
+      <p:nvGrpSpPr>
+        <p:cNvPr id="1" name=""/>
+        <p:cNvGrpSpPr/>
+        <p:nvPr/>
+      </p:nvGrpSpPr>
+      <p:grpSpPr>
+        <a:xfrm>
+          <a:off x="0" y="0"/>
+          <a:ext cx="0" cy="0"/>
+          <a:chOff x="0" y="0"/>
+          <a:chExt cx="0" cy="0"/>
+        </a:xfrm>
+      </p:grpSpPr>
+      <p:sp>
+        <p:nvSpPr>
+          <p:cNvPr id="3" name="TextBox 2"/>
+          <p:cNvSpPr txBox="1"/>
+          <p:nvPr/>
+        </p:nvSpPr>
+        <p:spPr>
+          <a:xfrm>
+            <a:off x="377232" y="35353"/>
+            <a:ext cx="4544514" cy="923330"/>
+          </a:xfrm>
+          <a:prstGeom prst="rect">
+            <a:avLst/>
+          </a:prstGeom>
+          <a:noFill/>
+        </p:spPr>
+        <p:txBody>
+          <a:bodyPr wrap="none" rtlCol="0">
+            <a:spAutoFit/>
+          </a:bodyPr>
+          <a:lstStyle/>
+          <a:p>
+            <a:r>
+              <a:rPr lang="en-US" sz="5400" b="1" dirty="0" smtClean="0"/>
+              <a:t>Sprint </a:t>
+            </a:r>
+            <a:r>
+              <a:rPr lang="en-US" sz="5400" b="1" dirty="0" smtClean="0"/>
+              <a:t>3 </a:t>
+            </a:r>
+            <a:r>
+              <a:rPr lang="en-US" sz="5400" b="1" dirty="0" smtClean="0"/>
+              <a:t>Stories</a:t>
+            </a:r>
+            <a:endParaRPr lang="en-US" sz="5400" b="1" dirty="0"/>
+          </a:p>
+        </p:txBody>
+      </p:sp>
+      <p:sp>
+        <p:nvSpPr>
+          <p:cNvPr id="5" name="TextBox 4"/>
+          <p:cNvSpPr txBox="1"/>
+          <p:nvPr/>
+        </p:nvSpPr>
+        <p:spPr>
+          <a:xfrm>
+            <a:off x="5268036" y="35353"/>
+            <a:ext cx="6315969" cy="923330"/>
+          </a:xfrm>
+          <a:prstGeom prst="rect">
+            <a:avLst/>
+          </a:prstGeom>
+          <a:noFill/>
+        </p:spPr>
+        <p:txBody>
+          <a:bodyPr wrap="square" rtlCol="0">
+            <a:spAutoFit/>
+          </a:bodyPr>
+          <a:lstStyle/>
+          <a:p>
+            <a:r>
+              <a:rPr lang="en-US" sz="5400" b="1" dirty="0" smtClean="0"/>
+              <a:t>My Sprint </a:t>
+            </a:r>
+            <a:r>
+              <a:rPr lang="en-US" sz="5400" b="1" dirty="0" smtClean="0"/>
+              <a:t>3 </a:t>
+            </a:r>
+            <a:r>
+              <a:rPr lang="en-US" sz="5400" b="1" dirty="0" smtClean="0"/>
+              <a:t>Stories</a:t>
+            </a:r>
+            <a:endParaRPr lang="en-US" sz="5400" b="1" dirty="0"/>
+          </a:p>
+        </p:txBody>
+      </p:sp>
+      <p:sp>
+        <p:nvSpPr>
+          <p:cNvPr id="6" name="TextBox 5"/>
+          <p:cNvSpPr txBox="1"/>
+          <p:nvPr/>
+        </p:nvSpPr>
+        <p:spPr>
+          <a:xfrm>
+            <a:off x="2281474" y="4435958"/>
+            <a:ext cx="1896631" cy="1569660"/>
+          </a:xfrm>
+          <a:prstGeom prst="rect">
+            <a:avLst/>
+          </a:prstGeom>
+          <a:noFill/>
+        </p:spPr>
+        <p:txBody>
+          <a:bodyPr wrap="square" rtlCol="0">
+            <a:spAutoFit/>
+          </a:bodyPr>
+          <a:lstStyle/>
+          <a:p>
+            <a:r>
+              <a:rPr lang="en-US" sz="4800" b="1" dirty="0" smtClean="0"/>
+              <a:t>Total </a:t>
+            </a:r>
+            <a:r>
+              <a:rPr lang="en-US" sz="4800" b="1" dirty="0" smtClean="0"/>
+              <a:t>?? pts</a:t>
+            </a:r>
+            <a:endParaRPr lang="en-US" sz="4800" b="1" dirty="0"/>
+          </a:p>
+        </p:txBody>
+      </p:sp>
+      <p:sp>
+        <p:nvSpPr>
+          <p:cNvPr id="8" name="TextBox 7"/>
+          <p:cNvSpPr txBox="1"/>
+          <p:nvPr/>
+        </p:nvSpPr>
+        <p:spPr>
+          <a:xfrm>
+            <a:off x="10165987" y="4449003"/>
+            <a:ext cx="1777079" cy="1569660"/>
+          </a:xfrm>
+          <a:prstGeom prst="rect">
+            <a:avLst/>
+          </a:prstGeom>
+          <a:noFill/>
+        </p:spPr>
+        <p:txBody>
+          <a:bodyPr wrap="square" rtlCol="0">
+            <a:spAutoFit/>
+          </a:bodyPr>
+          <a:lstStyle/>
+          <a:p>
+            <a:r>
+              <a:rPr lang="en-US" sz="4800" b="1" dirty="0" smtClean="0"/>
+              <a:t>Total </a:t>
+            </a:r>
+            <a:r>
+              <a:rPr lang="en-US" sz="4800" b="1" dirty="0" smtClean="0"/>
+              <a:t>?? pts</a:t>
+            </a:r>
+            <a:endParaRPr lang="en-US" sz="4800" b="1" dirty="0"/>
+          </a:p>
+        </p:txBody>
+      </p:sp>
+      <p:cxnSp>
+        <p:nvCxnSpPr>
+          <p:cNvPr id="24" name="Straight Connector 23"/>
+          <p:cNvCxnSpPr/>
+          <p:nvPr/>
+        </p:nvCxnSpPr>
+        <p:spPr>
+          <a:xfrm>
+            <a:off x="5003634" y="35353"/>
+            <a:ext cx="0" cy="5970265"/>
+          </a:xfrm>
+          <a:prstGeom prst="line">
+            <a:avLst/>
+          </a:prstGeom>
+        </p:spPr>
+        <p:style>
+          <a:lnRef idx="1">
+            <a:schemeClr val="accent1"/>
+          </a:lnRef>
+          <a:fillRef idx="0">
+            <a:schemeClr val="accent1"/>
+          </a:fillRef>
+          <a:effectRef idx="0">
+            <a:schemeClr val="accent1"/>
+          </a:effectRef>
+          <a:fontRef idx="minor">
+            <a:schemeClr val="tx1"/>
+          </a:fontRef>
+        </p:style>
+      </p:cxnSp>
+    </p:spTree>
+    <p:extLst>
+      <p:ext uri="{BB962C8B-B14F-4D97-AF65-F5344CB8AC3E}">
+        <p14:creationId xmlns:p14="http://schemas.microsoft.com/office/powerpoint/2010/main" val="3730670445"/>
+      </p:ext>
+    </p:extLst>
+  </p:cSld>
+  <p:clrMapOvr>
+    <a:masterClrMapping/>
+  </p:clrMapOvr>
+  <p:timing>
+    <p:tnLst>
+      <p:par>
+        <p:cTn id="1" dur="indefinite" restart="never" nodeType="tmRoot"/>
+      </p:par>
+    </p:tnLst>
+  </p:timing>
 </p:sld>
 </file>
 
@@ -4139,8 +4448,8 @@
         </p:nvSpPr>
         <p:spPr>
           <a:xfrm>
-            <a:off x="5947847" y="35353"/>
-            <a:ext cx="5636158" cy="923330"/>
+            <a:off x="5268036" y="35353"/>
+            <a:ext cx="6315969" cy="923330"/>
           </a:xfrm>
           <a:prstGeom prst="rect">
             <a:avLst/>
@@ -4148,7 +4457,7 @@
           <a:noFill/>
         </p:spPr>
         <p:txBody>
-          <a:bodyPr wrap="none" rtlCol="0">
+          <a:bodyPr wrap="square" rtlCol="0">
             <a:spAutoFit/>
           </a:bodyPr>
           <a:lstStyle/>
@@ -4185,7 +4494,15 @@
           <a:p>
             <a:r>
               <a:rPr lang="en-US" sz="4800" b="1" dirty="0" smtClean="0"/>
-              <a:t>Total 66 pts</a:t>
+              <a:t>Total </a:t>
+            </a:r>
+            <a:r>
+              <a:rPr lang="en-US" sz="4800" b="1" dirty="0" smtClean="0"/>
+              <a:t>76 </a:t>
+            </a:r>
+            <a:r>
+              <a:rPr lang="en-US" sz="4800" b="1" dirty="0" smtClean="0"/>
+              <a:t>pts</a:t>
             </a:r>
             <a:endParaRPr lang="en-US" sz="4800" b="1" dirty="0"/>
           </a:p>
@@ -4207,7 +4524,7 @@
         </p:blipFill>
         <p:spPr>
           <a:xfrm>
-            <a:off x="6037331" y="958683"/>
+            <a:off x="5394636" y="945638"/>
             <a:ext cx="1790817" cy="5059980"/>
           </a:xfrm>
           <a:prstGeom prst="rect">
@@ -4223,7 +4540,7 @@
         </p:nvSpPr>
         <p:spPr>
           <a:xfrm>
-            <a:off x="7828148" y="4449003"/>
+            <a:off x="10165987" y="4449003"/>
             <a:ext cx="1777079" cy="1569660"/>
           </a:xfrm>
           <a:prstGeom prst="rect">
@@ -4239,12 +4556,226 @@
           <a:p>
             <a:r>
               <a:rPr lang="en-US" sz="4800" b="1" dirty="0" smtClean="0"/>
-              <a:t>Total 30 pts</a:t>
+              <a:t>Total </a:t>
+            </a:r>
+            <a:r>
+              <a:rPr lang="en-US" sz="4800" b="1" dirty="0" smtClean="0"/>
+              <a:t>40pts</a:t>
             </a:r>
             <a:endParaRPr lang="en-US" sz="4800" b="1" dirty="0"/>
           </a:p>
         </p:txBody>
       </p:sp>
+      <p:sp>
+        <p:nvSpPr>
+          <p:cNvPr id="9" name="TextBox 8"/>
+          <p:cNvSpPr txBox="1"/>
+          <p:nvPr/>
+        </p:nvSpPr>
+        <p:spPr>
+          <a:xfrm>
+            <a:off x="7265533" y="1060558"/>
+            <a:ext cx="2700226" cy="461665"/>
+          </a:xfrm>
+          <a:prstGeom prst="rect">
+            <a:avLst/>
+          </a:prstGeom>
+          <a:noFill/>
+        </p:spPr>
+        <p:txBody>
+          <a:bodyPr wrap="none" rtlCol="0">
+            <a:spAutoFit/>
+          </a:bodyPr>
+          <a:lstStyle/>
+          <a:p>
+            <a:r>
+              <a:rPr lang="en-US" sz="2400" b="1" dirty="0" smtClean="0"/>
+              <a:t>Done and approved</a:t>
+            </a:r>
+            <a:endParaRPr lang="en-US" sz="2400" b="1" dirty="0"/>
+          </a:p>
+        </p:txBody>
+      </p:sp>
+      <p:sp>
+        <p:nvSpPr>
+          <p:cNvPr id="15" name="TextBox 14"/>
+          <p:cNvSpPr txBox="1"/>
+          <p:nvPr/>
+        </p:nvSpPr>
+        <p:spPr>
+          <a:xfrm>
+            <a:off x="7325607" y="2790717"/>
+            <a:ext cx="2700226" cy="461665"/>
+          </a:xfrm>
+          <a:prstGeom prst="rect">
+            <a:avLst/>
+          </a:prstGeom>
+          <a:noFill/>
+        </p:spPr>
+        <p:txBody>
+          <a:bodyPr wrap="none" rtlCol="0">
+            <a:spAutoFit/>
+          </a:bodyPr>
+          <a:lstStyle/>
+          <a:p>
+            <a:r>
+              <a:rPr lang="en-US" sz="2400" b="1" dirty="0" smtClean="0"/>
+              <a:t>Done and approved</a:t>
+            </a:r>
+            <a:endParaRPr lang="en-US" sz="2400" b="1" dirty="0"/>
+          </a:p>
+        </p:txBody>
+      </p:sp>
+      <p:sp>
+        <p:nvSpPr>
+          <p:cNvPr id="16" name="TextBox 15"/>
+          <p:cNvSpPr txBox="1"/>
+          <p:nvPr/>
+        </p:nvSpPr>
+        <p:spPr>
+          <a:xfrm>
+            <a:off x="7312053" y="1970385"/>
+            <a:ext cx="2700226" cy="461665"/>
+          </a:xfrm>
+          <a:prstGeom prst="rect">
+            <a:avLst/>
+          </a:prstGeom>
+          <a:noFill/>
+        </p:spPr>
+        <p:txBody>
+          <a:bodyPr wrap="none" rtlCol="0">
+            <a:spAutoFit/>
+          </a:bodyPr>
+          <a:lstStyle/>
+          <a:p>
+            <a:r>
+              <a:rPr lang="en-US" sz="2400" b="1" dirty="0" smtClean="0"/>
+              <a:t>Done and approved</a:t>
+            </a:r>
+            <a:endParaRPr lang="en-US" sz="2400" b="1" dirty="0"/>
+          </a:p>
+        </p:txBody>
+      </p:sp>
+      <p:sp>
+        <p:nvSpPr>
+          <p:cNvPr id="17" name="TextBox 16"/>
+          <p:cNvSpPr txBox="1"/>
+          <p:nvPr/>
+        </p:nvSpPr>
+        <p:spPr>
+          <a:xfrm>
+            <a:off x="7325607" y="4524621"/>
+            <a:ext cx="2700226" cy="461665"/>
+          </a:xfrm>
+          <a:prstGeom prst="rect">
+            <a:avLst/>
+          </a:prstGeom>
+          <a:noFill/>
+        </p:spPr>
+        <p:txBody>
+          <a:bodyPr wrap="none" rtlCol="0">
+            <a:spAutoFit/>
+          </a:bodyPr>
+          <a:lstStyle/>
+          <a:p>
+            <a:r>
+              <a:rPr lang="en-US" sz="2400" b="1" dirty="0" smtClean="0"/>
+              <a:t>Done and approved</a:t>
+            </a:r>
+            <a:endParaRPr lang="en-US" sz="2400" b="1" dirty="0"/>
+          </a:p>
+        </p:txBody>
+      </p:sp>
+      <p:sp>
+        <p:nvSpPr>
+          <p:cNvPr id="18" name="TextBox 17"/>
+          <p:cNvSpPr txBox="1"/>
+          <p:nvPr/>
+        </p:nvSpPr>
+        <p:spPr>
+          <a:xfrm>
+            <a:off x="7325607" y="3734713"/>
+            <a:ext cx="2700226" cy="461665"/>
+          </a:xfrm>
+          <a:prstGeom prst="rect">
+            <a:avLst/>
+          </a:prstGeom>
+          <a:noFill/>
+        </p:spPr>
+        <p:txBody>
+          <a:bodyPr wrap="none" rtlCol="0">
+            <a:spAutoFit/>
+          </a:bodyPr>
+          <a:lstStyle/>
+          <a:p>
+            <a:r>
+              <a:rPr lang="en-US" sz="2400" b="1" dirty="0" smtClean="0"/>
+              <a:t>Done and approved</a:t>
+            </a:r>
+            <a:endParaRPr lang="en-US" sz="2400" b="1" dirty="0"/>
+          </a:p>
+        </p:txBody>
+      </p:sp>
+      <p:sp>
+        <p:nvSpPr>
+          <p:cNvPr id="19" name="TextBox 18"/>
+          <p:cNvSpPr txBox="1"/>
+          <p:nvPr/>
+        </p:nvSpPr>
+        <p:spPr>
+          <a:xfrm>
+            <a:off x="7312053" y="5265918"/>
+            <a:ext cx="2700226" cy="461665"/>
+          </a:xfrm>
+          <a:prstGeom prst="rect">
+            <a:avLst/>
+          </a:prstGeom>
+          <a:noFill/>
+        </p:spPr>
+        <p:txBody>
+          <a:bodyPr wrap="none" rtlCol="0">
+            <a:spAutoFit/>
+          </a:bodyPr>
+          <a:lstStyle/>
+          <a:p>
+            <a:r>
+              <a:rPr lang="en-US" sz="2400" b="1" dirty="0" smtClean="0"/>
+              <a:t>Done and approved</a:t>
+            </a:r>
+            <a:endParaRPr lang="en-US" sz="2400" b="1" dirty="0"/>
+          </a:p>
+        </p:txBody>
+      </p:sp>
+      <p:cxnSp>
+        <p:nvCxnSpPr>
+          <p:cNvPr id="24" name="Straight Connector 23"/>
+          <p:cNvCxnSpPr/>
+          <p:nvPr/>
+        </p:nvCxnSpPr>
+        <p:spPr>
+          <a:xfrm>
+            <a:off x="5003634" y="35353"/>
+            <a:ext cx="0" cy="5970265"/>
+          </a:xfrm>
+          <a:prstGeom prst="line">
+            <a:avLst/>
+          </a:prstGeom>
+        </p:spPr>
+        <p:style>
+          <a:lnRef idx="1">
+            <a:schemeClr val="accent1"/>
+          </a:lnRef>
+          <a:fillRef idx="0">
+            <a:schemeClr val="accent1"/>
+          </a:fillRef>
+          <a:effectRef idx="0">
+            <a:schemeClr val="accent1"/>
+          </a:effectRef>
+          <a:fontRef idx="minor">
+            <a:schemeClr val="tx1"/>
+          </a:fontRef>
+        </p:style>
+      </p:cxnSp>
     </p:spTree>
     <p:extLst>
       <p:ext uri="{BB962C8B-B14F-4D97-AF65-F5344CB8AC3E}">
@@ -4930,11 +5461,7 @@
             <a:pPr algn="ctr"/>
             <a:r>
               <a:rPr lang="en-US" sz="5400" b="1" dirty="0" smtClean="0"/>
-              <a:t>Sequence Diagram </a:t>
-            </a:r>
-            <a:r>
-              <a:rPr lang="en-US" sz="5400" b="1" dirty="0" smtClean="0"/>
-              <a:t>(Change Status)</a:t>
+              <a:t>Sequence Diagram (Change Status)</a:t>
             </a:r>
             <a:endParaRPr lang="en-US" sz="5400" b="1" dirty="0"/>
           </a:p>

</xml_diff>

<commit_message>
Updated presentation Sprint 2
</commit_message>
<xml_diff>
--- a/Documents/Our Docs/Slides/Sprint2Presentation.pptx
+++ b/Documents/Our Docs/Slides/Sprint2Presentation.pptx
@@ -13,14 +13,14 @@
     <p:sldId id="266" r:id="rId4"/>
     <p:sldId id="262" r:id="rId5"/>
     <p:sldId id="267" r:id="rId6"/>
-    <p:sldId id="268" r:id="rId7"/>
-    <p:sldId id="269" r:id="rId8"/>
-    <p:sldId id="270" r:id="rId9"/>
-    <p:sldId id="271" r:id="rId10"/>
-    <p:sldId id="272" r:id="rId11"/>
-    <p:sldId id="273" r:id="rId12"/>
-    <p:sldId id="274" r:id="rId13"/>
-    <p:sldId id="264" r:id="rId14"/>
+    <p:sldId id="264" r:id="rId7"/>
+    <p:sldId id="274" r:id="rId8"/>
+    <p:sldId id="268" r:id="rId9"/>
+    <p:sldId id="269" r:id="rId10"/>
+    <p:sldId id="270" r:id="rId11"/>
+    <p:sldId id="271" r:id="rId12"/>
+    <p:sldId id="272" r:id="rId13"/>
+    <p:sldId id="273" r:id="rId14"/>
     <p:sldId id="275" r:id="rId15"/>
     <p:sldId id="276" r:id="rId16"/>
     <p:sldId id="277" r:id="rId17"/>
@@ -212,7 +212,7 @@
           <a:p>
             <a:fld id="{87857EF3-CB16-4D9F-BA52-FAE19D95CBEC}" type="datetimeFigureOut">
               <a:rPr lang="en-US" smtClean="0"/>
-              <a:t>3/1/2015</a:t>
+              <a:t>3/2/2015</a:t>
             </a:fld>
             <a:endParaRPr lang="en-US"/>
           </a:p>
@@ -695,7 +695,7 @@
           <a:p>
             <a:fld id="{EF7662E3-674D-464C-A6F0-577B5998971D}" type="datetimeFigureOut">
               <a:rPr lang="en-US" smtClean="0"/>
-              <a:t>3/1/2015</a:t>
+              <a:t>3/2/2015</a:t>
             </a:fld>
             <a:endParaRPr lang="en-US"/>
           </a:p>
@@ -865,7 +865,7 @@
           <a:p>
             <a:fld id="{EF7662E3-674D-464C-A6F0-577B5998971D}" type="datetimeFigureOut">
               <a:rPr lang="en-US" smtClean="0"/>
-              <a:t>3/1/2015</a:t>
+              <a:t>3/2/2015</a:t>
             </a:fld>
             <a:endParaRPr lang="en-US"/>
           </a:p>
@@ -1045,7 +1045,7 @@
           <a:p>
             <a:fld id="{EF7662E3-674D-464C-A6F0-577B5998971D}" type="datetimeFigureOut">
               <a:rPr lang="en-US" smtClean="0"/>
-              <a:t>3/1/2015</a:t>
+              <a:t>3/2/2015</a:t>
             </a:fld>
             <a:endParaRPr lang="en-US"/>
           </a:p>
@@ -1215,7 +1215,7 @@
           <a:p>
             <a:fld id="{EF7662E3-674D-464C-A6F0-577B5998971D}" type="datetimeFigureOut">
               <a:rPr lang="en-US" smtClean="0"/>
-              <a:t>3/1/2015</a:t>
+              <a:t>3/2/2015</a:t>
             </a:fld>
             <a:endParaRPr lang="en-US"/>
           </a:p>
@@ -1461,7 +1461,7 @@
           <a:p>
             <a:fld id="{EF7662E3-674D-464C-A6F0-577B5998971D}" type="datetimeFigureOut">
               <a:rPr lang="en-US" smtClean="0"/>
-              <a:t>3/1/2015</a:t>
+              <a:t>3/2/2015</a:t>
             </a:fld>
             <a:endParaRPr lang="en-US"/>
           </a:p>
@@ -1693,7 +1693,7 @@
           <a:p>
             <a:fld id="{EF7662E3-674D-464C-A6F0-577B5998971D}" type="datetimeFigureOut">
               <a:rPr lang="en-US" smtClean="0"/>
-              <a:t>3/1/2015</a:t>
+              <a:t>3/2/2015</a:t>
             </a:fld>
             <a:endParaRPr lang="en-US"/>
           </a:p>
@@ -2060,7 +2060,7 @@
           <a:p>
             <a:fld id="{EF7662E3-674D-464C-A6F0-577B5998971D}" type="datetimeFigureOut">
               <a:rPr lang="en-US" smtClean="0"/>
-              <a:t>3/1/2015</a:t>
+              <a:t>3/2/2015</a:t>
             </a:fld>
             <a:endParaRPr lang="en-US"/>
           </a:p>
@@ -2178,7 +2178,7 @@
           <a:p>
             <a:fld id="{EF7662E3-674D-464C-A6F0-577B5998971D}" type="datetimeFigureOut">
               <a:rPr lang="en-US" smtClean="0"/>
-              <a:t>3/1/2015</a:t>
+              <a:t>3/2/2015</a:t>
             </a:fld>
             <a:endParaRPr lang="en-US"/>
           </a:p>
@@ -2273,7 +2273,7 @@
           <a:p>
             <a:fld id="{EF7662E3-674D-464C-A6F0-577B5998971D}" type="datetimeFigureOut">
               <a:rPr lang="en-US" smtClean="0"/>
-              <a:t>3/1/2015</a:t>
+              <a:t>3/2/2015</a:t>
             </a:fld>
             <a:endParaRPr lang="en-US"/>
           </a:p>
@@ -2550,7 +2550,7 @@
           <a:p>
             <a:fld id="{EF7662E3-674D-464C-A6F0-577B5998971D}" type="datetimeFigureOut">
               <a:rPr lang="en-US" smtClean="0"/>
-              <a:t>3/1/2015</a:t>
+              <a:t>3/2/2015</a:t>
             </a:fld>
             <a:endParaRPr lang="en-US"/>
           </a:p>
@@ -2803,7 +2803,7 @@
           <a:p>
             <a:fld id="{EF7662E3-674D-464C-A6F0-577B5998971D}" type="datetimeFigureOut">
               <a:rPr lang="en-US" smtClean="0"/>
-              <a:t>3/1/2015</a:t>
+              <a:t>3/2/2015</a:t>
             </a:fld>
             <a:endParaRPr lang="en-US"/>
           </a:p>
@@ -3016,7 +3016,7 @@
           <a:p>
             <a:fld id="{EF7662E3-674D-464C-A6F0-577B5998971D}" type="datetimeFigureOut">
               <a:rPr lang="en-US" smtClean="0"/>
-              <a:t>3/1/2015</a:t>
+              <a:t>3/2/2015</a:t>
             </a:fld>
             <a:endParaRPr lang="en-US"/>
           </a:p>
@@ -3649,8 +3649,8 @@
         </p:nvSpPr>
         <p:spPr>
           <a:xfrm>
-            <a:off x="1649317" y="0"/>
-            <a:ext cx="8846012" cy="923330"/>
+            <a:off x="590368" y="0"/>
+            <a:ext cx="10963900" cy="923330"/>
           </a:xfrm>
           <a:prstGeom prst="rect">
             <a:avLst/>
@@ -3666,7 +3666,7 @@
             <a:pPr algn="ctr"/>
             <a:r>
               <a:rPr lang="en-US" sz="5400" b="1" dirty="0" smtClean="0"/>
-              <a:t>Sequence Diagram (Re Assign)</a:t>
+              <a:t>Sequence Diagram (Create Comment)</a:t>
             </a:r>
             <a:endParaRPr lang="en-US" sz="5400" b="1" dirty="0"/>
           </a:p>
@@ -3674,7 +3674,7 @@
       </p:sp>
       <p:pic>
         <p:nvPicPr>
-          <p:cNvPr id="2" name="Picture 1"/>
+          <p:cNvPr id="8" name="Picture 7"/>
           <p:cNvPicPr>
             <a:picLocks noChangeAspect="1"/>
           </p:cNvPicPr>
@@ -3694,8 +3694,8 @@
         </p:blipFill>
         <p:spPr>
           <a:xfrm>
-            <a:off x="122830" y="923330"/>
-            <a:ext cx="12069170" cy="5709482"/>
+            <a:off x="218364" y="923330"/>
+            <a:ext cx="11855196" cy="5934670"/>
           </a:xfrm>
           <a:prstGeom prst="rect">
             <a:avLst/>
@@ -3705,7 +3705,7 @@
     </p:spTree>
     <p:extLst>
       <p:ext uri="{BB962C8B-B14F-4D97-AF65-F5344CB8AC3E}">
-        <p14:creationId xmlns:p14="http://schemas.microsoft.com/office/powerpoint/2010/main" val="2724270991"/>
+        <p14:creationId xmlns:p14="http://schemas.microsoft.com/office/powerpoint/2010/main" val="1836531638"/>
       </p:ext>
     </p:extLst>
   </p:cSld>
@@ -3747,8 +3747,8 @@
         </p:nvSpPr>
         <p:spPr>
           <a:xfrm>
-            <a:off x="1849276" y="0"/>
-            <a:ext cx="8446095" cy="923330"/>
+            <a:off x="782508" y="0"/>
+            <a:ext cx="10579627" cy="923330"/>
           </a:xfrm>
           <a:prstGeom prst="rect">
             <a:avLst/>
@@ -3764,7 +3764,7 @@
             <a:pPr algn="ctr"/>
             <a:r>
               <a:rPr lang="en-US" sz="5400" b="1" dirty="0" smtClean="0"/>
-              <a:t>Sequence Diagram (Escalate)</a:t>
+              <a:t>Sequence Diagram (Change Status)</a:t>
             </a:r>
             <a:endParaRPr lang="en-US" sz="5400" b="1" dirty="0"/>
           </a:p>
@@ -3792,8 +3792,8 @@
         </p:blipFill>
         <p:spPr>
           <a:xfrm>
-            <a:off x="95534" y="923330"/>
-            <a:ext cx="12096465" cy="5934670"/>
+            <a:off x="99515" y="923330"/>
+            <a:ext cx="11855924" cy="5934670"/>
           </a:xfrm>
           <a:prstGeom prst="rect">
             <a:avLst/>
@@ -3803,7 +3803,7 @@
     </p:spTree>
     <p:extLst>
       <p:ext uri="{BB962C8B-B14F-4D97-AF65-F5344CB8AC3E}">
-        <p14:creationId xmlns:p14="http://schemas.microsoft.com/office/powerpoint/2010/main" val="2683004697"/>
+        <p14:creationId xmlns:p14="http://schemas.microsoft.com/office/powerpoint/2010/main" val="3916744053"/>
       </p:ext>
     </p:extLst>
   </p:cSld>
@@ -3845,8 +3845,8 @@
         </p:nvSpPr>
         <p:spPr>
           <a:xfrm>
-            <a:off x="1822126" y="0"/>
-            <a:ext cx="8500405" cy="923330"/>
+            <a:off x="1649317" y="0"/>
+            <a:ext cx="8846012" cy="923330"/>
           </a:xfrm>
           <a:prstGeom prst="rect">
             <a:avLst/>
@@ -3862,7 +3862,7 @@
             <a:pPr algn="ctr"/>
             <a:r>
               <a:rPr lang="en-US" sz="5400" b="1" dirty="0" smtClean="0"/>
-              <a:t>Class Diagram (Ticket Events)</a:t>
+              <a:t>Sequence Diagram (Re Assign)</a:t>
             </a:r>
             <a:endParaRPr lang="en-US" sz="5400" b="1" dirty="0"/>
           </a:p>
@@ -3890,8 +3890,8 @@
         </p:blipFill>
         <p:spPr>
           <a:xfrm>
-            <a:off x="403959" y="923330"/>
-            <a:ext cx="11032865" cy="5654891"/>
+            <a:off x="122830" y="923330"/>
+            <a:ext cx="12069170" cy="5709482"/>
           </a:xfrm>
           <a:prstGeom prst="rect">
             <a:avLst/>
@@ -3901,7 +3901,7 @@
     </p:spTree>
     <p:extLst>
       <p:ext uri="{BB962C8B-B14F-4D97-AF65-F5344CB8AC3E}">
-        <p14:creationId xmlns:p14="http://schemas.microsoft.com/office/powerpoint/2010/main" val="3920713465"/>
+        <p14:creationId xmlns:p14="http://schemas.microsoft.com/office/powerpoint/2010/main" val="2724270991"/>
       </p:ext>
     </p:extLst>
   </p:cSld>
@@ -3943,8 +3943,8 @@
         </p:nvSpPr>
         <p:spPr>
           <a:xfrm>
-            <a:off x="4285212" y="0"/>
-            <a:ext cx="3481274" cy="923330"/>
+            <a:off x="1849276" y="0"/>
+            <a:ext cx="8446095" cy="923330"/>
           </a:xfrm>
           <a:prstGeom prst="rect">
             <a:avLst/>
@@ -3957,9 +3957,10 @@
           </a:bodyPr>
           <a:lstStyle/>
           <a:p>
+            <a:pPr algn="ctr"/>
             <a:r>
               <a:rPr lang="en-US" sz="5400" b="1" dirty="0" smtClean="0"/>
-              <a:t>ER Diagram</a:t>
+              <a:t>Sequence Diagram (Escalate)</a:t>
             </a:r>
             <a:endParaRPr lang="en-US" sz="5400" b="1" dirty="0"/>
           </a:p>
@@ -3987,8 +3988,8 @@
         </p:blipFill>
         <p:spPr>
           <a:xfrm>
-            <a:off x="327546" y="923330"/>
-            <a:ext cx="11682484" cy="5520332"/>
+            <a:off x="95534" y="923330"/>
+            <a:ext cx="12096465" cy="5934670"/>
           </a:xfrm>
           <a:prstGeom prst="rect">
             <a:avLst/>
@@ -3998,13 +3999,20 @@
     </p:spTree>
     <p:extLst>
       <p:ext uri="{BB962C8B-B14F-4D97-AF65-F5344CB8AC3E}">
-        <p14:creationId xmlns:p14="http://schemas.microsoft.com/office/powerpoint/2010/main" val="3687344030"/>
+        <p14:creationId xmlns:p14="http://schemas.microsoft.com/office/powerpoint/2010/main" val="2683004697"/>
       </p:ext>
     </p:extLst>
   </p:cSld>
   <p:clrMapOvr>
     <a:masterClrMapping/>
   </p:clrMapOvr>
+  <p:timing>
+    <p:tnLst>
+      <p:par>
+        <p:cTn id="1" dur="indefinite" restart="never" nodeType="tmRoot"/>
+      </p:par>
+    </p:tnLst>
+  </p:timing>
 </p:sld>
 </file>
 
@@ -4062,6 +4070,30 @@
           </a:p>
         </p:txBody>
       </p:sp>
+      <p:pic>
+        <p:nvPicPr>
+          <p:cNvPr id="5" name="Picture 4"/>
+          <p:cNvPicPr>
+            <a:picLocks noChangeAspect="1"/>
+          </p:cNvPicPr>
+          <p:nvPr/>
+        </p:nvPicPr>
+        <p:blipFill>
+          <a:blip r:embed="rId2"/>
+          <a:stretch>
+            <a:fillRect/>
+          </a:stretch>
+        </p:blipFill>
+        <p:spPr>
+          <a:xfrm>
+            <a:off x="2584980" y="923330"/>
+            <a:ext cx="8242110" cy="5302155"/>
+          </a:xfrm>
+          <a:prstGeom prst="rect">
+            <a:avLst/>
+          </a:prstGeom>
+        </p:spPr>
+      </p:pic>
     </p:spTree>
     <p:extLst>
       <p:ext uri="{BB962C8B-B14F-4D97-AF65-F5344CB8AC3E}">
@@ -4177,52 +4209,14 @@
       </p:grpSpPr>
       <p:sp>
         <p:nvSpPr>
-          <p:cNvPr id="3" name="TextBox 2"/>
-          <p:cNvSpPr txBox="1"/>
-          <p:nvPr/>
-        </p:nvSpPr>
-        <p:spPr>
-          <a:xfrm>
-            <a:off x="377232" y="35353"/>
-            <a:ext cx="4544514" cy="923330"/>
-          </a:xfrm>
-          <a:prstGeom prst="rect">
-            <a:avLst/>
-          </a:prstGeom>
-          <a:noFill/>
-        </p:spPr>
-        <p:txBody>
-          <a:bodyPr wrap="none" rtlCol="0">
-            <a:spAutoFit/>
-          </a:bodyPr>
-          <a:lstStyle/>
-          <a:p>
-            <a:r>
-              <a:rPr lang="en-US" sz="5400" b="1" dirty="0" smtClean="0"/>
-              <a:t>Sprint </a:t>
-            </a:r>
-            <a:r>
-              <a:rPr lang="en-US" sz="5400" b="1" dirty="0" smtClean="0"/>
-              <a:t>3 </a:t>
-            </a:r>
-            <a:r>
-              <a:rPr lang="en-US" sz="5400" b="1" dirty="0" smtClean="0"/>
-              <a:t>Stories</a:t>
-            </a:r>
-            <a:endParaRPr lang="en-US" sz="5400" b="1" dirty="0"/>
-          </a:p>
-        </p:txBody>
-      </p:sp>
-      <p:sp>
-        <p:nvSpPr>
           <p:cNvPr id="5" name="TextBox 4"/>
           <p:cNvSpPr txBox="1"/>
           <p:nvPr/>
         </p:nvSpPr>
         <p:spPr>
           <a:xfrm>
-            <a:off x="5268036" y="35353"/>
-            <a:ext cx="6315969" cy="923330"/>
+            <a:off x="3643954" y="-68239"/>
+            <a:ext cx="4694830" cy="923330"/>
           </a:xfrm>
           <a:prstGeom prst="rect">
             <a:avLst/>
@@ -4237,15 +4231,11 @@
           <a:p>
             <a:r>
               <a:rPr lang="en-US" sz="5400" b="1" dirty="0" smtClean="0"/>
-              <a:t>My Sprint </a:t>
+              <a:t>Sprint </a:t>
             </a:r>
             <a:r>
               <a:rPr lang="en-US" sz="5400" b="1" dirty="0" smtClean="0"/>
-              <a:t>3 </a:t>
-            </a:r>
-            <a:r>
-              <a:rPr lang="en-US" sz="5400" b="1" dirty="0" smtClean="0"/>
-              <a:t>Stories</a:t>
+              <a:t>3 Stories</a:t>
             </a:r>
             <a:endParaRPr lang="en-US" sz="5400" b="1" dirty="0"/>
           </a:p>
@@ -4253,14 +4243,14 @@
       </p:sp>
       <p:sp>
         <p:nvSpPr>
-          <p:cNvPr id="6" name="TextBox 5"/>
+          <p:cNvPr id="8" name="TextBox 7"/>
           <p:cNvSpPr txBox="1"/>
           <p:nvPr/>
         </p:nvSpPr>
         <p:spPr>
           <a:xfrm>
-            <a:off x="2281474" y="4435958"/>
-            <a:ext cx="1896631" cy="1569660"/>
+            <a:off x="7108888" y="2947748"/>
+            <a:ext cx="1777079" cy="1569660"/>
           </a:xfrm>
           <a:prstGeom prst="rect">
             <a:avLst/>
@@ -4279,76 +4269,40 @@
             </a:r>
             <a:r>
               <a:rPr lang="en-US" sz="4800" b="1" dirty="0" smtClean="0"/>
-              <a:t>?? pts</a:t>
+              <a:t>40 </a:t>
+            </a:r>
+            <a:r>
+              <a:rPr lang="en-US" sz="4800" b="1" dirty="0" smtClean="0"/>
+              <a:t>pts</a:t>
             </a:r>
             <a:endParaRPr lang="en-US" sz="4800" b="1" dirty="0"/>
           </a:p>
         </p:txBody>
       </p:sp>
-      <p:sp>
-        <p:nvSpPr>
-          <p:cNvPr id="8" name="TextBox 7"/>
-          <p:cNvSpPr txBox="1"/>
+      <p:pic>
+        <p:nvPicPr>
+          <p:cNvPr id="2" name="Picture 1"/>
+          <p:cNvPicPr>
+            <a:picLocks noChangeAspect="1"/>
+          </p:cNvPicPr>
           <p:nvPr/>
-        </p:nvSpPr>
-        <p:spPr>
-          <a:xfrm>
-            <a:off x="10165987" y="4449003"/>
-            <a:ext cx="1777079" cy="1569660"/>
+        </p:nvPicPr>
+        <p:blipFill>
+          <a:blip r:embed="rId2"/>
+          <a:stretch>
+            <a:fillRect/>
+          </a:stretch>
+        </p:blipFill>
+        <p:spPr>
+          <a:xfrm>
+            <a:off x="4831309" y="1094936"/>
+            <a:ext cx="1992571" cy="5275285"/>
           </a:xfrm>
           <a:prstGeom prst="rect">
             <a:avLst/>
           </a:prstGeom>
-          <a:noFill/>
-        </p:spPr>
-        <p:txBody>
-          <a:bodyPr wrap="square" rtlCol="0">
-            <a:spAutoFit/>
-          </a:bodyPr>
-          <a:lstStyle/>
-          <a:p>
-            <a:r>
-              <a:rPr lang="en-US" sz="4800" b="1" dirty="0" smtClean="0"/>
-              <a:t>Total </a:t>
-            </a:r>
-            <a:r>
-              <a:rPr lang="en-US" sz="4800" b="1" dirty="0" smtClean="0"/>
-              <a:t>?? pts</a:t>
-            </a:r>
-            <a:endParaRPr lang="en-US" sz="4800" b="1" dirty="0"/>
-          </a:p>
-        </p:txBody>
-      </p:sp>
-      <p:cxnSp>
-        <p:nvCxnSpPr>
-          <p:cNvPr id="24" name="Straight Connector 23"/>
-          <p:cNvCxnSpPr/>
-          <p:nvPr/>
-        </p:nvCxnSpPr>
-        <p:spPr>
-          <a:xfrm>
-            <a:off x="5003634" y="35353"/>
-            <a:ext cx="0" cy="5970265"/>
-          </a:xfrm>
-          <a:prstGeom prst="line">
-            <a:avLst/>
-          </a:prstGeom>
-        </p:spPr>
-        <p:style>
-          <a:lnRef idx="1">
-            <a:schemeClr val="accent1"/>
-          </a:lnRef>
-          <a:fillRef idx="0">
-            <a:schemeClr val="accent1"/>
-          </a:fillRef>
-          <a:effectRef idx="0">
-            <a:schemeClr val="accent1"/>
-          </a:effectRef>
-          <a:fontRef idx="minor">
-            <a:schemeClr val="tx1"/>
-          </a:fontRef>
-        </p:style>
-      </p:cxnSp>
+        </p:spPr>
+      </p:pic>
     </p:spTree>
     <p:extLst>
       <p:ext uri="{BB962C8B-B14F-4D97-AF65-F5344CB8AC3E}">
@@ -4494,15 +4448,7 @@
           <a:p>
             <a:r>
               <a:rPr lang="en-US" sz="4800" b="1" dirty="0" smtClean="0"/>
-              <a:t>Total </a:t>
-            </a:r>
-            <a:r>
-              <a:rPr lang="en-US" sz="4800" b="1" dirty="0" smtClean="0"/>
-              <a:t>76 </a:t>
-            </a:r>
-            <a:r>
-              <a:rPr lang="en-US" sz="4800" b="1" dirty="0" smtClean="0"/>
-              <a:t>pts</a:t>
+              <a:t>Total 76 pts</a:t>
             </a:r>
             <a:endParaRPr lang="en-US" sz="4800" b="1" dirty="0"/>
           </a:p>
@@ -4556,11 +4502,7 @@
           <a:p>
             <a:r>
               <a:rPr lang="en-US" sz="4800" b="1" dirty="0" smtClean="0"/>
-              <a:t>Total </a:t>
-            </a:r>
-            <a:r>
-              <a:rPr lang="en-US" sz="4800" b="1" dirty="0" smtClean="0"/>
-              <a:t>40pts</a:t>
+              <a:t>Total 40pts</a:t>
             </a:r>
             <a:endParaRPr lang="en-US" sz="4800" b="1" dirty="0"/>
           </a:p>
@@ -5150,8 +5092,8 @@
         </p:nvSpPr>
         <p:spPr>
           <a:xfrm>
-            <a:off x="1149622" y="0"/>
-            <a:ext cx="9845388" cy="923330"/>
+            <a:off x="4285212" y="0"/>
+            <a:ext cx="3481274" cy="923330"/>
           </a:xfrm>
           <a:prstGeom prst="rect">
             <a:avLst/>
@@ -5164,10 +5106,9 @@
           </a:bodyPr>
           <a:lstStyle/>
           <a:p>
-            <a:pPr algn="ctr"/>
             <a:r>
               <a:rPr lang="en-US" sz="5400" b="1" dirty="0" smtClean="0"/>
-              <a:t>Sequence Diagram (Create Ticket)</a:t>
+              <a:t>ER Diagram</a:t>
             </a:r>
             <a:endParaRPr lang="en-US" sz="5400" b="1" dirty="0"/>
           </a:p>
@@ -5175,7 +5116,7 @@
       </p:sp>
       <p:pic>
         <p:nvPicPr>
-          <p:cNvPr id="6" name="Picture 5"/>
+          <p:cNvPr id="4" name="Picture 3"/>
           <p:cNvPicPr>
             <a:picLocks noChangeAspect="1"/>
           </p:cNvPicPr>
@@ -5195,8 +5136,8 @@
         </p:blipFill>
         <p:spPr>
           <a:xfrm>
-            <a:off x="-272956" y="923330"/>
-            <a:ext cx="12078269" cy="5777721"/>
+            <a:off x="327546" y="923330"/>
+            <a:ext cx="11682484" cy="5520332"/>
           </a:xfrm>
           <a:prstGeom prst="rect">
             <a:avLst/>
@@ -5206,20 +5147,13 @@
     </p:spTree>
     <p:extLst>
       <p:ext uri="{BB962C8B-B14F-4D97-AF65-F5344CB8AC3E}">
-        <p14:creationId xmlns:p14="http://schemas.microsoft.com/office/powerpoint/2010/main" val="2855734241"/>
+        <p14:creationId xmlns:p14="http://schemas.microsoft.com/office/powerpoint/2010/main" val="3687344030"/>
       </p:ext>
     </p:extLst>
   </p:cSld>
   <p:clrMapOvr>
     <a:masterClrMapping/>
   </p:clrMapOvr>
-  <p:timing>
-    <p:tnLst>
-      <p:par>
-        <p:cTn id="1" dur="indefinite" restart="never" nodeType="tmRoot"/>
-      </p:par>
-    </p:tnLst>
-  </p:timing>
 </p:sld>
 </file>
 
@@ -5248,8 +5182,8 @@
         </p:nvSpPr>
         <p:spPr>
           <a:xfrm>
-            <a:off x="1358848" y="0"/>
-            <a:ext cx="9426940" cy="923330"/>
+            <a:off x="1822126" y="0"/>
+            <a:ext cx="8500405" cy="923330"/>
           </a:xfrm>
           <a:prstGeom prst="rect">
             <a:avLst/>
@@ -5265,7 +5199,7 @@
             <a:pPr algn="ctr"/>
             <a:r>
               <a:rPr lang="en-US" sz="5400" b="1" dirty="0" smtClean="0"/>
-              <a:t>Sequence Diagram (View Ticket)</a:t>
+              <a:t>Class Diagram (Ticket Events)</a:t>
             </a:r>
             <a:endParaRPr lang="en-US" sz="5400" b="1" dirty="0"/>
           </a:p>
@@ -5273,7 +5207,7 @@
       </p:sp>
       <p:pic>
         <p:nvPicPr>
-          <p:cNvPr id="4" name="Picture 3"/>
+          <p:cNvPr id="2" name="Picture 1"/>
           <p:cNvPicPr>
             <a:picLocks noChangeAspect="1"/>
           </p:cNvPicPr>
@@ -5293,8 +5227,8 @@
         </p:blipFill>
         <p:spPr>
           <a:xfrm>
-            <a:off x="1" y="923329"/>
-            <a:ext cx="12056050" cy="5934671"/>
+            <a:off x="403959" y="923330"/>
+            <a:ext cx="11032865" cy="5654891"/>
           </a:xfrm>
           <a:prstGeom prst="rect">
             <a:avLst/>
@@ -5304,7 +5238,7 @@
     </p:spTree>
     <p:extLst>
       <p:ext uri="{BB962C8B-B14F-4D97-AF65-F5344CB8AC3E}">
-        <p14:creationId xmlns:p14="http://schemas.microsoft.com/office/powerpoint/2010/main" val="2101179196"/>
+        <p14:creationId xmlns:p14="http://schemas.microsoft.com/office/powerpoint/2010/main" val="3920713465"/>
       </p:ext>
     </p:extLst>
   </p:cSld>
@@ -5346,8 +5280,8 @@
         </p:nvSpPr>
         <p:spPr>
           <a:xfrm>
-            <a:off x="590368" y="0"/>
-            <a:ext cx="10963900" cy="923330"/>
+            <a:off x="1149622" y="0"/>
+            <a:ext cx="9845388" cy="923330"/>
           </a:xfrm>
           <a:prstGeom prst="rect">
             <a:avLst/>
@@ -5363,7 +5297,7 @@
             <a:pPr algn="ctr"/>
             <a:r>
               <a:rPr lang="en-US" sz="5400" b="1" dirty="0" smtClean="0"/>
-              <a:t>Sequence Diagram (Create Comment)</a:t>
+              <a:t>Sequence Diagram (Create Ticket)</a:t>
             </a:r>
             <a:endParaRPr lang="en-US" sz="5400" b="1" dirty="0"/>
           </a:p>
@@ -5371,7 +5305,7 @@
       </p:sp>
       <p:pic>
         <p:nvPicPr>
-          <p:cNvPr id="8" name="Picture 7"/>
+          <p:cNvPr id="6" name="Picture 5"/>
           <p:cNvPicPr>
             <a:picLocks noChangeAspect="1"/>
           </p:cNvPicPr>
@@ -5391,8 +5325,8 @@
         </p:blipFill>
         <p:spPr>
           <a:xfrm>
-            <a:off x="218364" y="923330"/>
-            <a:ext cx="11855196" cy="5934670"/>
+            <a:off x="-272956" y="923330"/>
+            <a:ext cx="12078269" cy="5777721"/>
           </a:xfrm>
           <a:prstGeom prst="rect">
             <a:avLst/>
@@ -5402,7 +5336,7 @@
     </p:spTree>
     <p:extLst>
       <p:ext uri="{BB962C8B-B14F-4D97-AF65-F5344CB8AC3E}">
-        <p14:creationId xmlns:p14="http://schemas.microsoft.com/office/powerpoint/2010/main" val="1836531638"/>
+        <p14:creationId xmlns:p14="http://schemas.microsoft.com/office/powerpoint/2010/main" val="2855734241"/>
       </p:ext>
     </p:extLst>
   </p:cSld>
@@ -5444,8 +5378,8 @@
         </p:nvSpPr>
         <p:spPr>
           <a:xfrm>
-            <a:off x="782508" y="0"/>
-            <a:ext cx="10579627" cy="923330"/>
+            <a:off x="1358848" y="0"/>
+            <a:ext cx="9426940" cy="923330"/>
           </a:xfrm>
           <a:prstGeom prst="rect">
             <a:avLst/>
@@ -5461,7 +5395,7 @@
             <a:pPr algn="ctr"/>
             <a:r>
               <a:rPr lang="en-US" sz="5400" b="1" dirty="0" smtClean="0"/>
-              <a:t>Sequence Diagram (Change Status)</a:t>
+              <a:t>Sequence Diagram (View Ticket)</a:t>
             </a:r>
             <a:endParaRPr lang="en-US" sz="5400" b="1" dirty="0"/>
           </a:p>
@@ -5489,8 +5423,8 @@
         </p:blipFill>
         <p:spPr>
           <a:xfrm>
-            <a:off x="99515" y="923330"/>
-            <a:ext cx="11855924" cy="5934670"/>
+            <a:off x="1" y="923329"/>
+            <a:ext cx="12056050" cy="5934671"/>
           </a:xfrm>
           <a:prstGeom prst="rect">
             <a:avLst/>
@@ -5500,7 +5434,7 @@
     </p:spTree>
     <p:extLst>
       <p:ext uri="{BB962C8B-B14F-4D97-AF65-F5344CB8AC3E}">
-        <p14:creationId xmlns:p14="http://schemas.microsoft.com/office/powerpoint/2010/main" val="3916744053"/>
+        <p14:creationId xmlns:p14="http://schemas.microsoft.com/office/powerpoint/2010/main" val="2101179196"/>
       </p:ext>
     </p:extLst>
   </p:cSld>

</xml_diff>